<commit_message>
Includes section at end for P-test and conclusion
</commit_message>
<xml_diff>
--- a/Happiness Challenge/Happiness.pptx
+++ b/Happiness Challenge/Happiness.pptx
@@ -19,6 +19,12 @@
     <p:sldId id="266" r:id="rId13"/>
     <p:sldId id="267" r:id="rId14"/>
     <p:sldId id="269" r:id="rId15"/>
+    <p:sldId id="270" r:id="rId16"/>
+    <p:sldId id="271" r:id="rId17"/>
+    <p:sldId id="272" r:id="rId18"/>
+    <p:sldId id="273" r:id="rId19"/>
+    <p:sldId id="274" r:id="rId20"/>
+    <p:sldId id="275" r:id="rId21"/>
   </p:sldIdLst>
   <p:sldSz cx="9144000" cy="6858000" type="screen4x3"/>
   <p:notesSz cx="6858000" cy="9144000"/>
@@ -191,7 +197,7 @@
           <a:p>
             <a:fld id="{D9CB10DF-9DB7-EA47-A15B-9142B27755C4}" type="datetimeFigureOut">
               <a:rPr lang="en-US" smtClean="0"/>
-              <a:t>2/13/16</a:t>
+              <a:t>2/20/16</a:t>
             </a:fld>
             <a:endParaRPr lang="en-US"/>
           </a:p>
@@ -716,7 +722,7 @@
           <a:p>
             <a:fld id="{D9CB10DF-9DB7-EA47-A15B-9142B27755C4}" type="datetimeFigureOut">
               <a:rPr lang="en-US" smtClean="0"/>
-              <a:t>2/13/16</a:t>
+              <a:t>2/20/16</a:t>
             </a:fld>
             <a:endParaRPr lang="en-US"/>
           </a:p>
@@ -1030,7 +1036,7 @@
           <a:p>
             <a:fld id="{D9CB10DF-9DB7-EA47-A15B-9142B27755C4}" type="datetimeFigureOut">
               <a:rPr lang="en-US" smtClean="0"/>
-              <a:t>2/13/16</a:t>
+              <a:t>2/20/16</a:t>
             </a:fld>
             <a:endParaRPr lang="en-US"/>
           </a:p>
@@ -1316,7 +1322,7 @@
           <a:p>
             <a:fld id="{D9CB10DF-9DB7-EA47-A15B-9142B27755C4}" type="datetimeFigureOut">
               <a:rPr lang="en-US" smtClean="0"/>
-              <a:t>2/13/16</a:t>
+              <a:t>2/20/16</a:t>
             </a:fld>
             <a:endParaRPr lang="en-US"/>
           </a:p>
@@ -1891,7 +1897,7 @@
           <a:p>
             <a:fld id="{D9CB10DF-9DB7-EA47-A15B-9142B27755C4}" type="datetimeFigureOut">
               <a:rPr lang="en-US" smtClean="0"/>
-              <a:t>2/13/16</a:t>
+              <a:t>2/20/16</a:t>
             </a:fld>
             <a:endParaRPr lang="en-US"/>
           </a:p>
@@ -1981,7 +1987,7 @@
           <a:p>
             <a:fld id="{D9CB10DF-9DB7-EA47-A15B-9142B27755C4}" type="datetimeFigureOut">
               <a:rPr lang="en-US" smtClean="0"/>
-              <a:t>2/13/16</a:t>
+              <a:t>2/20/16</a:t>
             </a:fld>
             <a:endParaRPr lang="en-US"/>
           </a:p>
@@ -2690,7 +2696,7 @@
           <a:p>
             <a:fld id="{D9CB10DF-9DB7-EA47-A15B-9142B27755C4}" type="datetimeFigureOut">
               <a:rPr lang="en-US" smtClean="0"/>
-              <a:t>2/13/16</a:t>
+              <a:t>2/20/16</a:t>
             </a:fld>
             <a:endParaRPr lang="en-US"/>
           </a:p>
@@ -2942,7 +2948,7 @@
           <a:p>
             <a:fld id="{D9CB10DF-9DB7-EA47-A15B-9142B27755C4}" type="datetimeFigureOut">
               <a:rPr lang="en-US" smtClean="0"/>
-              <a:t>2/13/16</a:t>
+              <a:t>2/20/16</a:t>
             </a:fld>
             <a:endParaRPr lang="en-US"/>
           </a:p>
@@ -3171,7 +3177,7 @@
           <a:p>
             <a:fld id="{D9CB10DF-9DB7-EA47-A15B-9142B27755C4}" type="datetimeFigureOut">
               <a:rPr lang="en-US" smtClean="0"/>
-              <a:t>2/13/16</a:t>
+              <a:t>2/20/16</a:t>
             </a:fld>
             <a:endParaRPr lang="en-US"/>
           </a:p>
@@ -3445,7 +3451,7 @@
           <a:p>
             <a:fld id="{D9CB10DF-9DB7-EA47-A15B-9142B27755C4}" type="datetimeFigureOut">
               <a:rPr lang="en-US" smtClean="0"/>
-              <a:t>2/13/16</a:t>
+              <a:t>2/20/16</a:t>
             </a:fld>
             <a:endParaRPr lang="en-US"/>
           </a:p>
@@ -3731,7 +3737,7 @@
           <a:p>
             <a:fld id="{D9CB10DF-9DB7-EA47-A15B-9142B27755C4}" type="datetimeFigureOut">
               <a:rPr lang="en-US" smtClean="0"/>
-              <a:t>2/13/16</a:t>
+              <a:t>2/20/16</a:t>
             </a:fld>
             <a:endParaRPr lang="en-US"/>
           </a:p>
@@ -3999,7 +4005,7 @@
           <a:p>
             <a:fld id="{D9CB10DF-9DB7-EA47-A15B-9142B27755C4}" type="datetimeFigureOut">
               <a:rPr lang="en-US" smtClean="0"/>
-              <a:t>2/13/16</a:t>
+              <a:t>2/20/16</a:t>
             </a:fld>
             <a:endParaRPr lang="en-US"/>
           </a:p>
@@ -5252,6 +5258,631 @@
 </p:sld>
 </file>
 
+<file path=ppt/slides/slide15.xml><?xml version="1.0" encoding="utf-8"?>
+<p:sld xmlns:a="http://schemas.openxmlformats.org/drawingml/2006/main" xmlns:r="http://schemas.openxmlformats.org/officeDocument/2006/relationships" xmlns:p="http://schemas.openxmlformats.org/presentationml/2006/main">
+  <p:cSld>
+    <p:spTree>
+      <p:nvGrpSpPr>
+        <p:cNvPr id="1" name=""/>
+        <p:cNvGrpSpPr/>
+        <p:nvPr/>
+      </p:nvGrpSpPr>
+      <p:grpSpPr>
+        <a:xfrm>
+          <a:off x="0" y="0"/>
+          <a:ext cx="0" cy="0"/>
+          <a:chOff x="0" y="0"/>
+          <a:chExt cx="0" cy="0"/>
+        </a:xfrm>
+      </p:grpSpPr>
+      <p:sp>
+        <p:nvSpPr>
+          <p:cNvPr id="2" name="Content Placeholder 1"/>
+          <p:cNvSpPr>
+            <a:spLocks noGrp="1"/>
+          </p:cNvSpPr>
+          <p:nvPr>
+            <p:ph idx="1"/>
+          </p:nvPr>
+        </p:nvSpPr>
+        <p:spPr/>
+        <p:txBody>
+          <a:bodyPr/>
+          <a:lstStyle/>
+          <a:p>
+            <a:r>
+              <a:rPr lang="en-US" b="1" dirty="0" smtClean="0"/>
+              <a:t>Hypothesis</a:t>
+            </a:r>
+            <a:r>
+              <a:rPr lang="en-US" dirty="0" smtClean="0"/>
+              <a:t>: Young adults (18-30) are happier than the rest of the population (30+)</a:t>
+            </a:r>
+          </a:p>
+          <a:p>
+            <a:endParaRPr lang="en-US" dirty="0"/>
+          </a:p>
+          <a:p>
+            <a:pPr marL="0" indent="0">
+              <a:buNone/>
+            </a:pPr>
+            <a:endParaRPr lang="en-US" dirty="0" smtClean="0"/>
+          </a:p>
+          <a:p>
+            <a:pPr marL="0" indent="0">
+              <a:buNone/>
+            </a:pPr>
+            <a:endParaRPr lang="en-US" dirty="0" smtClean="0"/>
+          </a:p>
+          <a:p>
+            <a:r>
+              <a:rPr lang="en-US" b="1" dirty="0" smtClean="0"/>
+              <a:t>Null Hypothesis: </a:t>
+            </a:r>
+            <a:r>
+              <a:rPr lang="en-US" dirty="0" smtClean="0"/>
+              <a:t>Young adults are </a:t>
+            </a:r>
+            <a:r>
+              <a:rPr lang="en-US" b="1" dirty="0" smtClean="0"/>
+              <a:t>not</a:t>
+            </a:r>
+            <a:r>
+              <a:rPr lang="en-US" dirty="0" smtClean="0"/>
+              <a:t> happier than the rest of the population</a:t>
+            </a:r>
+          </a:p>
+        </p:txBody>
+      </p:sp>
+      <p:sp>
+        <p:nvSpPr>
+          <p:cNvPr id="3" name="Title 2"/>
+          <p:cNvSpPr>
+            <a:spLocks noGrp="1"/>
+          </p:cNvSpPr>
+          <p:nvPr>
+            <p:ph type="title"/>
+          </p:nvPr>
+        </p:nvSpPr>
+        <p:spPr/>
+        <p:txBody>
+          <a:bodyPr/>
+          <a:lstStyle/>
+          <a:p>
+            <a:r>
+              <a:rPr lang="en-US" dirty="0" smtClean="0"/>
+              <a:t>P-Value Calculation</a:t>
+            </a:r>
+            <a:endParaRPr lang="en-US" dirty="0"/>
+          </a:p>
+        </p:txBody>
+      </p:sp>
+    </p:spTree>
+    <p:extLst>
+      <p:ext uri="{BB962C8B-B14F-4D97-AF65-F5344CB8AC3E}">
+        <p14:creationId xmlns:p14="http://schemas.microsoft.com/office/powerpoint/2010/main" val="1551746163"/>
+      </p:ext>
+    </p:extLst>
+  </p:cSld>
+  <p:clrMapOvr>
+    <a:masterClrMapping/>
+  </p:clrMapOvr>
+</p:sld>
+</file>
+
+<file path=ppt/slides/slide16.xml><?xml version="1.0" encoding="utf-8"?>
+<p:sld xmlns:a="http://schemas.openxmlformats.org/drawingml/2006/main" xmlns:r="http://schemas.openxmlformats.org/officeDocument/2006/relationships" xmlns:p="http://schemas.openxmlformats.org/presentationml/2006/main">
+  <p:cSld>
+    <p:spTree>
+      <p:nvGrpSpPr>
+        <p:cNvPr id="1" name=""/>
+        <p:cNvGrpSpPr/>
+        <p:nvPr/>
+      </p:nvGrpSpPr>
+      <p:grpSpPr>
+        <a:xfrm>
+          <a:off x="0" y="0"/>
+          <a:ext cx="0" cy="0"/>
+          <a:chOff x="0" y="0"/>
+          <a:chExt cx="0" cy="0"/>
+        </a:xfrm>
+      </p:grpSpPr>
+      <p:sp>
+        <p:nvSpPr>
+          <p:cNvPr id="3" name="Title 2"/>
+          <p:cNvSpPr>
+            <a:spLocks noGrp="1"/>
+          </p:cNvSpPr>
+          <p:nvPr>
+            <p:ph type="title"/>
+          </p:nvPr>
+        </p:nvSpPr>
+        <p:spPr/>
+        <p:txBody>
+          <a:bodyPr/>
+          <a:lstStyle/>
+          <a:p>
+            <a:r>
+              <a:rPr lang="en-US" dirty="0" smtClean="0"/>
+              <a:t>Happiness Distribution</a:t>
+            </a:r>
+            <a:endParaRPr lang="en-US" dirty="0"/>
+          </a:p>
+        </p:txBody>
+      </p:sp>
+      <p:pic>
+        <p:nvPicPr>
+          <p:cNvPr id="4" name="Picture 3" descr="Screenshot 2016-02-20 13.38.03.png"/>
+          <p:cNvPicPr>
+            <a:picLocks noChangeAspect="1"/>
+          </p:cNvPicPr>
+          <p:nvPr/>
+        </p:nvPicPr>
+        <p:blipFill>
+          <a:blip r:embed="rId2">
+            <a:extLst>
+              <a:ext uri="{28A0092B-C50C-407E-A947-70E740481C1C}">
+                <a14:useLocalDpi xmlns:a14="http://schemas.microsoft.com/office/drawing/2010/main" val="0"/>
+              </a:ext>
+            </a:extLst>
+          </a:blip>
+          <a:stretch>
+            <a:fillRect/>
+          </a:stretch>
+        </p:blipFill>
+        <p:spPr>
+          <a:xfrm>
+            <a:off x="4546180" y="2129989"/>
+            <a:ext cx="4597820" cy="4248461"/>
+          </a:xfrm>
+          <a:prstGeom prst="rect">
+            <a:avLst/>
+          </a:prstGeom>
+        </p:spPr>
+      </p:pic>
+      <p:pic>
+        <p:nvPicPr>
+          <p:cNvPr id="5" name="Picture 4" descr="Screenshot 2016-02-20 13.38.10.png"/>
+          <p:cNvPicPr>
+            <a:picLocks noChangeAspect="1"/>
+          </p:cNvPicPr>
+          <p:nvPr/>
+        </p:nvPicPr>
+        <p:blipFill>
+          <a:blip r:embed="rId3">
+            <a:extLst>
+              <a:ext uri="{28A0092B-C50C-407E-A947-70E740481C1C}">
+                <a14:useLocalDpi xmlns:a14="http://schemas.microsoft.com/office/drawing/2010/main" val="0"/>
+              </a:ext>
+            </a:extLst>
+          </a:blip>
+          <a:stretch>
+            <a:fillRect/>
+          </a:stretch>
+        </p:blipFill>
+        <p:spPr>
+          <a:xfrm>
+            <a:off x="0" y="2129989"/>
+            <a:ext cx="4559021" cy="4248461"/>
+          </a:xfrm>
+          <a:prstGeom prst="rect">
+            <a:avLst/>
+          </a:prstGeom>
+        </p:spPr>
+      </p:pic>
+      <p:sp>
+        <p:nvSpPr>
+          <p:cNvPr id="6" name="Content Placeholder 1"/>
+          <p:cNvSpPr>
+            <a:spLocks noGrp="1"/>
+          </p:cNvSpPr>
+          <p:nvPr>
+            <p:ph idx="1"/>
+          </p:nvPr>
+        </p:nvSpPr>
+        <p:spPr>
+          <a:xfrm>
+            <a:off x="0" y="6378450"/>
+            <a:ext cx="9144000" cy="452908"/>
+          </a:xfrm>
+        </p:spPr>
+        <p:txBody>
+          <a:bodyPr>
+            <a:normAutofit/>
+          </a:bodyPr>
+          <a:lstStyle/>
+          <a:p>
+            <a:r>
+              <a:rPr lang="en-US" sz="1800" dirty="0" smtClean="0"/>
+              <a:t>Both groups look equally happy and have approximately the same distribution</a:t>
+            </a:r>
+          </a:p>
+        </p:txBody>
+      </p:sp>
+    </p:spTree>
+    <p:extLst>
+      <p:ext uri="{BB962C8B-B14F-4D97-AF65-F5344CB8AC3E}">
+        <p14:creationId xmlns:p14="http://schemas.microsoft.com/office/powerpoint/2010/main" val="121650279"/>
+      </p:ext>
+    </p:extLst>
+  </p:cSld>
+  <p:clrMapOvr>
+    <a:masterClrMapping/>
+  </p:clrMapOvr>
+</p:sld>
+</file>
+
+<file path=ppt/slides/slide17.xml><?xml version="1.0" encoding="utf-8"?>
+<p:sld xmlns:a="http://schemas.openxmlformats.org/drawingml/2006/main" xmlns:r="http://schemas.openxmlformats.org/officeDocument/2006/relationships" xmlns:p="http://schemas.openxmlformats.org/presentationml/2006/main">
+  <p:cSld>
+    <p:spTree>
+      <p:nvGrpSpPr>
+        <p:cNvPr id="1" name=""/>
+        <p:cNvGrpSpPr/>
+        <p:nvPr/>
+      </p:nvGrpSpPr>
+      <p:grpSpPr>
+        <a:xfrm>
+          <a:off x="0" y="0"/>
+          <a:ext cx="0" cy="0"/>
+          <a:chOff x="0" y="0"/>
+          <a:chExt cx="0" cy="0"/>
+        </a:xfrm>
+      </p:grpSpPr>
+      <p:sp>
+        <p:nvSpPr>
+          <p:cNvPr id="2" name="Content Placeholder 1"/>
+          <p:cNvSpPr>
+            <a:spLocks noGrp="1"/>
+          </p:cNvSpPr>
+          <p:nvPr>
+            <p:ph idx="1"/>
+          </p:nvPr>
+        </p:nvSpPr>
+        <p:spPr/>
+        <p:txBody>
+          <a:bodyPr/>
+          <a:lstStyle/>
+          <a:p>
+            <a:r>
+              <a:rPr lang="en-US" dirty="0" smtClean="0"/>
+              <a:t>Run some simulations</a:t>
+            </a:r>
+          </a:p>
+          <a:p>
+            <a:pPr lvl="1"/>
+            <a:r>
+              <a:rPr lang="en-US" dirty="0" smtClean="0"/>
+              <a:t>Number of simulations: 1,000</a:t>
+            </a:r>
+          </a:p>
+          <a:p>
+            <a:pPr lvl="2"/>
+            <a:r>
+              <a:rPr lang="en-US" dirty="0" smtClean="0"/>
+              <a:t>Use R’s “sample()” method</a:t>
+            </a:r>
+          </a:p>
+          <a:p>
+            <a:pPr lvl="1"/>
+            <a:r>
+              <a:rPr lang="en-US" dirty="0" smtClean="0"/>
+              <a:t>Calculate the average happiness for both groups in each of those 1,000 simulations, and store that average in the group’s respective array</a:t>
+            </a:r>
+          </a:p>
+          <a:p>
+            <a:pPr lvl="1"/>
+            <a:r>
+              <a:rPr lang="en-US" dirty="0" smtClean="0"/>
+              <a:t>Perform a T-Test on both arrays to calculate the P-value</a:t>
+            </a:r>
+          </a:p>
+          <a:p>
+            <a:pPr lvl="1"/>
+            <a:endParaRPr lang="en-US" dirty="0"/>
+          </a:p>
+        </p:txBody>
+      </p:sp>
+      <p:sp>
+        <p:nvSpPr>
+          <p:cNvPr id="3" name="Title 2"/>
+          <p:cNvSpPr>
+            <a:spLocks noGrp="1"/>
+          </p:cNvSpPr>
+          <p:nvPr>
+            <p:ph type="title"/>
+          </p:nvPr>
+        </p:nvSpPr>
+        <p:spPr/>
+        <p:txBody>
+          <a:bodyPr/>
+          <a:lstStyle/>
+          <a:p>
+            <a:r>
+              <a:rPr lang="en-US" dirty="0" smtClean="0"/>
+              <a:t>Further Steps</a:t>
+            </a:r>
+            <a:endParaRPr lang="en-US" dirty="0"/>
+          </a:p>
+        </p:txBody>
+      </p:sp>
+    </p:spTree>
+    <p:extLst>
+      <p:ext uri="{BB962C8B-B14F-4D97-AF65-F5344CB8AC3E}">
+        <p14:creationId xmlns:p14="http://schemas.microsoft.com/office/powerpoint/2010/main" val="818921148"/>
+      </p:ext>
+    </p:extLst>
+  </p:cSld>
+  <p:clrMapOvr>
+    <a:masterClrMapping/>
+  </p:clrMapOvr>
+</p:sld>
+</file>
+
+<file path=ppt/slides/slide18.xml><?xml version="1.0" encoding="utf-8"?>
+<p:sld xmlns:a="http://schemas.openxmlformats.org/drawingml/2006/main" xmlns:r="http://schemas.openxmlformats.org/officeDocument/2006/relationships" xmlns:p="http://schemas.openxmlformats.org/presentationml/2006/main">
+  <p:cSld>
+    <p:spTree>
+      <p:nvGrpSpPr>
+        <p:cNvPr id="1" name=""/>
+        <p:cNvGrpSpPr/>
+        <p:nvPr/>
+      </p:nvGrpSpPr>
+      <p:grpSpPr>
+        <a:xfrm>
+          <a:off x="0" y="0"/>
+          <a:ext cx="0" cy="0"/>
+          <a:chOff x="0" y="0"/>
+          <a:chExt cx="0" cy="0"/>
+        </a:xfrm>
+      </p:grpSpPr>
+      <p:sp>
+        <p:nvSpPr>
+          <p:cNvPr id="3" name="Title 2"/>
+          <p:cNvSpPr>
+            <a:spLocks noGrp="1"/>
+          </p:cNvSpPr>
+          <p:nvPr>
+            <p:ph type="title"/>
+          </p:nvPr>
+        </p:nvSpPr>
+        <p:spPr/>
+        <p:txBody>
+          <a:bodyPr/>
+          <a:lstStyle/>
+          <a:p>
+            <a:r>
+              <a:rPr lang="en-US" dirty="0" smtClean="0"/>
+              <a:t>Simulation Results</a:t>
+            </a:r>
+            <a:endParaRPr lang="en-US" dirty="0"/>
+          </a:p>
+        </p:txBody>
+      </p:sp>
+      <p:pic>
+        <p:nvPicPr>
+          <p:cNvPr id="5" name="Picture 4" descr="Screenshot 2016-02-20 13.37.50.png"/>
+          <p:cNvPicPr>
+            <a:picLocks noChangeAspect="1"/>
+          </p:cNvPicPr>
+          <p:nvPr/>
+        </p:nvPicPr>
+        <p:blipFill>
+          <a:blip r:embed="rId2">
+            <a:extLst>
+              <a:ext uri="{28A0092B-C50C-407E-A947-70E740481C1C}">
+                <a14:useLocalDpi xmlns:a14="http://schemas.microsoft.com/office/drawing/2010/main" val="0"/>
+              </a:ext>
+            </a:extLst>
+          </a:blip>
+          <a:stretch>
+            <a:fillRect/>
+          </a:stretch>
+        </p:blipFill>
+        <p:spPr>
+          <a:xfrm>
+            <a:off x="4733522" y="2406627"/>
+            <a:ext cx="4410478" cy="4451373"/>
+          </a:xfrm>
+          <a:prstGeom prst="rect">
+            <a:avLst/>
+          </a:prstGeom>
+        </p:spPr>
+      </p:pic>
+      <p:pic>
+        <p:nvPicPr>
+          <p:cNvPr id="6" name="Picture 5" descr="Screenshot 2016-02-20 13.37.56.png"/>
+          <p:cNvPicPr>
+            <a:picLocks noChangeAspect="1"/>
+          </p:cNvPicPr>
+          <p:nvPr/>
+        </p:nvPicPr>
+        <p:blipFill>
+          <a:blip r:embed="rId3">
+            <a:extLst>
+              <a:ext uri="{28A0092B-C50C-407E-A947-70E740481C1C}">
+                <a14:useLocalDpi xmlns:a14="http://schemas.microsoft.com/office/drawing/2010/main" val="0"/>
+              </a:ext>
+            </a:extLst>
+          </a:blip>
+          <a:stretch>
+            <a:fillRect/>
+          </a:stretch>
+        </p:blipFill>
+        <p:spPr>
+          <a:xfrm>
+            <a:off x="73443" y="2406627"/>
+            <a:ext cx="4544627" cy="4451373"/>
+          </a:xfrm>
+          <a:prstGeom prst="rect">
+            <a:avLst/>
+          </a:prstGeom>
+        </p:spPr>
+      </p:pic>
+    </p:spTree>
+    <p:extLst>
+      <p:ext uri="{BB962C8B-B14F-4D97-AF65-F5344CB8AC3E}">
+        <p14:creationId xmlns:p14="http://schemas.microsoft.com/office/powerpoint/2010/main" val="2986106831"/>
+      </p:ext>
+    </p:extLst>
+  </p:cSld>
+  <p:clrMapOvr>
+    <a:masterClrMapping/>
+  </p:clrMapOvr>
+</p:sld>
+</file>
+
+<file path=ppt/slides/slide19.xml><?xml version="1.0" encoding="utf-8"?>
+<p:sld xmlns:a="http://schemas.openxmlformats.org/drawingml/2006/main" xmlns:r="http://schemas.openxmlformats.org/officeDocument/2006/relationships" xmlns:p="http://schemas.openxmlformats.org/presentationml/2006/main">
+  <p:cSld>
+    <p:spTree>
+      <p:nvGrpSpPr>
+        <p:cNvPr id="1" name=""/>
+        <p:cNvGrpSpPr/>
+        <p:nvPr/>
+      </p:nvGrpSpPr>
+      <p:grpSpPr>
+        <a:xfrm>
+          <a:off x="0" y="0"/>
+          <a:ext cx="0" cy="0"/>
+          <a:chOff x="0" y="0"/>
+          <a:chExt cx="0" cy="0"/>
+        </a:xfrm>
+      </p:grpSpPr>
+      <p:sp>
+        <p:nvSpPr>
+          <p:cNvPr id="2" name="Content Placeholder 1"/>
+          <p:cNvSpPr>
+            <a:spLocks noGrp="1"/>
+          </p:cNvSpPr>
+          <p:nvPr>
+            <p:ph idx="1"/>
+          </p:nvPr>
+        </p:nvSpPr>
+        <p:spPr/>
+        <p:txBody>
+          <a:bodyPr>
+            <a:normAutofit lnSpcReduction="10000"/>
+          </a:bodyPr>
+          <a:lstStyle/>
+          <a:p>
+            <a:pPr>
+              <a:lnSpc>
+                <a:spcPct val="130000"/>
+              </a:lnSpc>
+            </a:pPr>
+            <a:r>
+              <a:rPr lang="en-US" dirty="0" smtClean="0"/>
+              <a:t>Results from using R’s “</a:t>
+            </a:r>
+            <a:r>
+              <a:rPr lang="en-US" dirty="0" err="1" smtClean="0"/>
+              <a:t>t.test</a:t>
+            </a:r>
+            <a:r>
+              <a:rPr lang="en-US" dirty="0" smtClean="0"/>
+              <a:t>(</a:t>
+            </a:r>
+            <a:r>
+              <a:rPr lang="en-US" dirty="0" err="1" smtClean="0"/>
+              <a:t>youngAdultSampleAverages</a:t>
+            </a:r>
+            <a:r>
+              <a:rPr lang="en-US" dirty="0" smtClean="0"/>
+              <a:t>, </a:t>
+            </a:r>
+            <a:r>
+              <a:rPr lang="en-US" dirty="0" err="1" smtClean="0"/>
+              <a:t>restOfAdultsSampleSaves</a:t>
+            </a:r>
+            <a:r>
+              <a:rPr lang="en-US" dirty="0" smtClean="0"/>
+              <a:t>)” (Welch Two Sample t-test) </a:t>
+            </a:r>
+          </a:p>
+          <a:p>
+            <a:pPr lvl="1">
+              <a:lnSpc>
+                <a:spcPct val="130000"/>
+              </a:lnSpc>
+            </a:pPr>
+            <a:r>
+              <a:rPr lang="en-US" dirty="0" smtClean="0"/>
+              <a:t>T-value: 1.8571</a:t>
+            </a:r>
+          </a:p>
+          <a:p>
+            <a:pPr lvl="1">
+              <a:lnSpc>
+                <a:spcPct val="130000"/>
+              </a:lnSpc>
+            </a:pPr>
+            <a:r>
+              <a:rPr lang="en-US" dirty="0" smtClean="0"/>
+              <a:t>Degrees of Freedom: 1995.1</a:t>
+            </a:r>
+          </a:p>
+          <a:p>
+            <a:pPr lvl="1">
+              <a:lnSpc>
+                <a:spcPct val="130000"/>
+              </a:lnSpc>
+            </a:pPr>
+            <a:r>
+              <a:rPr lang="en-US" dirty="0" smtClean="0"/>
+              <a:t>Mean of young adults: 5.3678</a:t>
+            </a:r>
+          </a:p>
+          <a:p>
+            <a:pPr lvl="1">
+              <a:lnSpc>
+                <a:spcPct val="130000"/>
+              </a:lnSpc>
+            </a:pPr>
+            <a:r>
+              <a:rPr lang="en-US" dirty="0" smtClean="0"/>
+              <a:t>Mean of rest of adults: 5.3287</a:t>
+            </a:r>
+            <a:endParaRPr lang="en-US" dirty="0"/>
+          </a:p>
+        </p:txBody>
+      </p:sp>
+      <p:sp>
+        <p:nvSpPr>
+          <p:cNvPr id="3" name="Title 2"/>
+          <p:cNvSpPr>
+            <a:spLocks noGrp="1"/>
+          </p:cNvSpPr>
+          <p:nvPr>
+            <p:ph type="title"/>
+          </p:nvPr>
+        </p:nvSpPr>
+        <p:spPr/>
+        <p:txBody>
+          <a:bodyPr/>
+          <a:lstStyle/>
+          <a:p>
+            <a:r>
+              <a:rPr lang="en-US" dirty="0" smtClean="0"/>
+              <a:t>Simulation Statistics</a:t>
+            </a:r>
+            <a:endParaRPr lang="en-US" dirty="0"/>
+          </a:p>
+        </p:txBody>
+      </p:sp>
+    </p:spTree>
+    <p:extLst>
+      <p:ext uri="{BB962C8B-B14F-4D97-AF65-F5344CB8AC3E}">
+        <p14:creationId xmlns:p14="http://schemas.microsoft.com/office/powerpoint/2010/main" val="2777200902"/>
+      </p:ext>
+    </p:extLst>
+  </p:cSld>
+  <p:clrMapOvr>
+    <a:masterClrMapping/>
+  </p:clrMapOvr>
+</p:sld>
+</file>
+
 <file path=ppt/slides/slide2.xml><?xml version="1.0" encoding="utf-8"?>
 <p:sld xmlns:a="http://schemas.openxmlformats.org/drawingml/2006/main" xmlns:r="http://schemas.openxmlformats.org/officeDocument/2006/relationships" xmlns:p="http://schemas.openxmlformats.org/presentationml/2006/main">
   <p:cSld>
@@ -5329,6 +5960,100 @@
     <p:extLst>
       <p:ext uri="{BB962C8B-B14F-4D97-AF65-F5344CB8AC3E}">
         <p14:creationId xmlns:p14="http://schemas.microsoft.com/office/powerpoint/2010/main" val="787161501"/>
+      </p:ext>
+    </p:extLst>
+  </p:cSld>
+  <p:clrMapOvr>
+    <a:masterClrMapping/>
+  </p:clrMapOvr>
+</p:sld>
+</file>
+
+<file path=ppt/slides/slide20.xml><?xml version="1.0" encoding="utf-8"?>
+<p:sld xmlns:a="http://schemas.openxmlformats.org/drawingml/2006/main" xmlns:r="http://schemas.openxmlformats.org/officeDocument/2006/relationships" xmlns:p="http://schemas.openxmlformats.org/presentationml/2006/main">
+  <p:cSld>
+    <p:spTree>
+      <p:nvGrpSpPr>
+        <p:cNvPr id="1" name=""/>
+        <p:cNvGrpSpPr/>
+        <p:nvPr/>
+      </p:nvGrpSpPr>
+      <p:grpSpPr>
+        <a:xfrm>
+          <a:off x="0" y="0"/>
+          <a:ext cx="0" cy="0"/>
+          <a:chOff x="0" y="0"/>
+          <a:chExt cx="0" cy="0"/>
+        </a:xfrm>
+      </p:grpSpPr>
+      <p:sp>
+        <p:nvSpPr>
+          <p:cNvPr id="2" name="Content Placeholder 1"/>
+          <p:cNvSpPr>
+            <a:spLocks noGrp="1"/>
+          </p:cNvSpPr>
+          <p:nvPr>
+            <p:ph idx="1"/>
+          </p:nvPr>
+        </p:nvSpPr>
+        <p:spPr/>
+        <p:txBody>
+          <a:bodyPr/>
+          <a:lstStyle/>
+          <a:p>
+            <a:r>
+              <a:rPr lang="en-US" dirty="0" smtClean="0"/>
+              <a:t>P-Value: 0.06344</a:t>
+            </a:r>
+          </a:p>
+          <a:p>
+            <a:r>
+              <a:rPr lang="en-US" dirty="0" smtClean="0"/>
+              <a:t>Because the P-value is greater than 0.05, we </a:t>
+            </a:r>
+            <a:r>
+              <a:rPr lang="en-US" b="1" dirty="0" smtClean="0"/>
+              <a:t>reject the null hypothesis </a:t>
+            </a:r>
+            <a:r>
+              <a:rPr lang="en-US" dirty="0" smtClean="0"/>
+              <a:t>and declare that </a:t>
+            </a:r>
+            <a:r>
+              <a:rPr lang="en-US" b="1" dirty="0" smtClean="0"/>
+              <a:t>young adults are happier than the rest of the population</a:t>
+            </a:r>
+            <a:endParaRPr lang="en-US" dirty="0" smtClean="0"/>
+          </a:p>
+        </p:txBody>
+      </p:sp>
+      <p:sp>
+        <p:nvSpPr>
+          <p:cNvPr id="3" name="Title 2"/>
+          <p:cNvSpPr>
+            <a:spLocks noGrp="1"/>
+          </p:cNvSpPr>
+          <p:nvPr>
+            <p:ph type="title"/>
+          </p:nvPr>
+        </p:nvSpPr>
+        <p:spPr/>
+        <p:txBody>
+          <a:bodyPr/>
+          <a:lstStyle/>
+          <a:p>
+            <a:r>
+              <a:rPr lang="en-US" dirty="0" smtClean="0"/>
+              <a:t>Conclusions</a:t>
+            </a:r>
+            <a:endParaRPr lang="en-US" dirty="0"/>
+          </a:p>
+        </p:txBody>
+      </p:sp>
+    </p:spTree>
+    <p:extLst>
+      <p:ext uri="{BB962C8B-B14F-4D97-AF65-F5344CB8AC3E}">
+        <p14:creationId xmlns:p14="http://schemas.microsoft.com/office/powerpoint/2010/main" val="656472487"/>
       </p:ext>
     </p:extLst>
   </p:cSld>

</xml_diff>